<commit_message>
update presentation and log4j configuration such that it will flush its buffer immediately
</commit_message>
<xml_diff>
--- a/Project presentation/SPA-Presentation.pptx
+++ b/Project presentation/SPA-Presentation.pptx
@@ -8,6 +8,8 @@
     <p:sldId id="256" r:id="rId2"/>
     <p:sldId id="259" r:id="rId3"/>
     <p:sldId id="260" r:id="rId4"/>
+    <p:sldId id="262" r:id="rId5"/>
+    <p:sldId id="263" r:id="rId6"/>
   </p:sldIdLst>
   <p:sldSz cx="12192000" cy="6858000"/>
   <p:notesSz cx="6858000" cy="9144000"/>
@@ -305,7 +307,7 @@
           <a:p>
             <a:fld id="{8048F7A8-0824-48EB-B124-DB066AAF77DC}" type="datetimeFigureOut">
               <a:rPr lang="en-US" smtClean="0"/>
-              <a:t>7/8/2020</a:t>
+              <a:t>08-Jul-20</a:t>
             </a:fld>
             <a:endParaRPr lang="en-US"/>
           </a:p>
@@ -741,7 +743,7 @@
           <a:p>
             <a:fld id="{8048F7A8-0824-48EB-B124-DB066AAF77DC}" type="datetimeFigureOut">
               <a:rPr lang="en-US" smtClean="0"/>
-              <a:t>7/8/2020</a:t>
+              <a:t>08-Jul-20</a:t>
             </a:fld>
             <a:endParaRPr lang="en-US"/>
           </a:p>
@@ -991,7 +993,7 @@
           <a:p>
             <a:fld id="{8048F7A8-0824-48EB-B124-DB066AAF77DC}" type="datetimeFigureOut">
               <a:rPr lang="en-US" smtClean="0"/>
-              <a:t>7/8/2020</a:t>
+              <a:t>08-Jul-20</a:t>
             </a:fld>
             <a:endParaRPr lang="en-US"/>
           </a:p>
@@ -1299,7 +1301,7 @@
           <a:p>
             <a:fld id="{8048F7A8-0824-48EB-B124-DB066AAF77DC}" type="datetimeFigureOut">
               <a:rPr lang="en-US" smtClean="0"/>
-              <a:t>7/8/2020</a:t>
+              <a:t>08-Jul-20</a:t>
             </a:fld>
             <a:endParaRPr lang="en-US"/>
           </a:p>
@@ -1617,7 +1619,7 @@
           <a:p>
             <a:fld id="{8048F7A8-0824-48EB-B124-DB066AAF77DC}" type="datetimeFigureOut">
               <a:rPr lang="en-US" smtClean="0"/>
-              <a:t>7/8/2020</a:t>
+              <a:t>08-Jul-20</a:t>
             </a:fld>
             <a:endParaRPr lang="en-US"/>
           </a:p>
@@ -1919,7 +1921,7 @@
           <a:p>
             <a:fld id="{8048F7A8-0824-48EB-B124-DB066AAF77DC}" type="datetimeFigureOut">
               <a:rPr lang="en-US" smtClean="0"/>
-              <a:t>7/8/2020</a:t>
+              <a:t>08-Jul-20</a:t>
             </a:fld>
             <a:endParaRPr lang="en-US"/>
           </a:p>
@@ -2286,7 +2288,7 @@
           <a:p>
             <a:fld id="{8048F7A8-0824-48EB-B124-DB066AAF77DC}" type="datetimeFigureOut">
               <a:rPr lang="en-US" smtClean="0"/>
-              <a:t>7/8/2020</a:t>
+              <a:t>08-Jul-20</a:t>
             </a:fld>
             <a:endParaRPr lang="en-US"/>
           </a:p>
@@ -2460,7 +2462,7 @@
           <a:p>
             <a:fld id="{8048F7A8-0824-48EB-B124-DB066AAF77DC}" type="datetimeFigureOut">
               <a:rPr lang="en-US" smtClean="0"/>
-              <a:t>7/8/2020</a:t>
+              <a:t>08-Jul-20</a:t>
             </a:fld>
             <a:endParaRPr lang="en-US"/>
           </a:p>
@@ -2640,7 +2642,7 @@
           <a:p>
             <a:fld id="{8048F7A8-0824-48EB-B124-DB066AAF77DC}" type="datetimeFigureOut">
               <a:rPr lang="en-US" smtClean="0"/>
-              <a:t>7/8/2020</a:t>
+              <a:t>08-Jul-20</a:t>
             </a:fld>
             <a:endParaRPr lang="en-US"/>
           </a:p>
@@ -2810,7 +2812,7 @@
           <a:p>
             <a:fld id="{8048F7A8-0824-48EB-B124-DB066AAF77DC}" type="datetimeFigureOut">
               <a:rPr lang="en-US" smtClean="0"/>
-              <a:t>7/8/2020</a:t>
+              <a:t>08-Jul-20</a:t>
             </a:fld>
             <a:endParaRPr lang="en-US"/>
           </a:p>
@@ -3060,7 +3062,7 @@
           <a:p>
             <a:fld id="{8048F7A8-0824-48EB-B124-DB066AAF77DC}" type="datetimeFigureOut">
               <a:rPr lang="en-US" smtClean="0"/>
-              <a:t>7/8/2020</a:t>
+              <a:t>08-Jul-20</a:t>
             </a:fld>
             <a:endParaRPr lang="en-US"/>
           </a:p>
@@ -3296,7 +3298,7 @@
           <a:p>
             <a:fld id="{8048F7A8-0824-48EB-B124-DB066AAF77DC}" type="datetimeFigureOut">
               <a:rPr lang="en-US" smtClean="0"/>
-              <a:t>7/8/2020</a:t>
+              <a:t>08-Jul-20</a:t>
             </a:fld>
             <a:endParaRPr lang="en-US"/>
           </a:p>
@@ -3678,7 +3680,7 @@
           <a:p>
             <a:fld id="{8048F7A8-0824-48EB-B124-DB066AAF77DC}" type="datetimeFigureOut">
               <a:rPr lang="en-US" smtClean="0"/>
-              <a:t>7/8/2020</a:t>
+              <a:t>08-Jul-20</a:t>
             </a:fld>
             <a:endParaRPr lang="en-US"/>
           </a:p>
@@ -3796,7 +3798,7 @@
           <a:p>
             <a:fld id="{8048F7A8-0824-48EB-B124-DB066AAF77DC}" type="datetimeFigureOut">
               <a:rPr lang="en-US" smtClean="0"/>
-              <a:t>7/8/2020</a:t>
+              <a:t>08-Jul-20</a:t>
             </a:fld>
             <a:endParaRPr lang="en-US"/>
           </a:p>
@@ -3891,7 +3893,7 @@
           <a:p>
             <a:fld id="{8048F7A8-0824-48EB-B124-DB066AAF77DC}" type="datetimeFigureOut">
               <a:rPr lang="en-US" smtClean="0"/>
-              <a:t>7/8/2020</a:t>
+              <a:t>08-Jul-20</a:t>
             </a:fld>
             <a:endParaRPr lang="en-US"/>
           </a:p>
@@ -4146,7 +4148,7 @@
           <a:p>
             <a:fld id="{8048F7A8-0824-48EB-B124-DB066AAF77DC}" type="datetimeFigureOut">
               <a:rPr lang="en-US" smtClean="0"/>
-              <a:t>7/8/2020</a:t>
+              <a:t>08-Jul-20</a:t>
             </a:fld>
             <a:endParaRPr lang="en-US"/>
           </a:p>
@@ -4429,7 +4431,7 @@
           <a:p>
             <a:fld id="{8048F7A8-0824-48EB-B124-DB066AAF77DC}" type="datetimeFigureOut">
               <a:rPr lang="en-US" smtClean="0"/>
-              <a:t>7/8/2020</a:t>
+              <a:t>08-Jul-20</a:t>
             </a:fld>
             <a:endParaRPr lang="en-US"/>
           </a:p>
@@ -4835,7 +4837,7 @@
           <a:p>
             <a:fld id="{8048F7A8-0824-48EB-B124-DB066AAF77DC}" type="datetimeFigureOut">
               <a:rPr lang="en-US" smtClean="0"/>
-              <a:t>7/8/2020</a:t>
+              <a:t>08-Jul-20</a:t>
             </a:fld>
             <a:endParaRPr lang="en-US"/>
           </a:p>
@@ -5386,7 +5388,12 @@
             <p:ph type="ctrTitle"/>
           </p:nvPr>
         </p:nvSpPr>
-        <p:spPr/>
+        <p:spPr>
+          <a:xfrm>
+            <a:off x="684212" y="590549"/>
+            <a:ext cx="7974013" cy="1676401"/>
+          </a:xfrm>
+        </p:spPr>
         <p:txBody>
           <a:bodyPr>
             <a:normAutofit/>
@@ -5418,8 +5425,8 @@
         </p:nvSpPr>
         <p:spPr>
           <a:xfrm>
-            <a:off x="684212" y="3843867"/>
-            <a:ext cx="7215188" cy="1947333"/>
+            <a:off x="684212" y="2266950"/>
+            <a:ext cx="7215188" cy="1128183"/>
           </a:xfrm>
         </p:spPr>
         <p:txBody>
@@ -5430,11 +5437,90 @@
           <a:p>
             <a:r>
               <a:rPr lang="en-US" sz="2800" dirty="0"/>
-              <a:t>By Haim Adrian, Idan Pollak and Lior Shor</a:t>
-            </a:r>
-          </a:p>
-        </p:txBody>
-      </p:sp>
+              <a:t>By </a:t>
+            </a:r>
+            <a:r>
+              <a:rPr lang="en-US" sz="2800" b="1" dirty="0"/>
+              <a:t>S</a:t>
+            </a:r>
+            <a:r>
+              <a:rPr lang="en-US" sz="2800" dirty="0"/>
+              <a:t>hor Lior, </a:t>
+            </a:r>
+            <a:r>
+              <a:rPr lang="en-US" sz="2800" b="1" dirty="0"/>
+              <a:t>P</a:t>
+            </a:r>
+            <a:r>
+              <a:rPr lang="en-US" sz="2800" dirty="0"/>
+              <a:t>ollak Idan and </a:t>
+            </a:r>
+            <a:r>
+              <a:rPr lang="en-US" sz="2800" b="1" dirty="0"/>
+              <a:t>A</a:t>
+            </a:r>
+            <a:r>
+              <a:rPr lang="en-US" sz="2800" dirty="0"/>
+              <a:t>drian Haim</a:t>
+            </a:r>
+          </a:p>
+        </p:txBody>
+      </p:sp>
+      <p:pic>
+        <p:nvPicPr>
+          <p:cNvPr id="5" name="Picture 4" descr="A group of people posing for a photo&#10;&#10;Description automatically generated">
+            <a:extLst>
+              <a:ext uri="{FF2B5EF4-FFF2-40B4-BE49-F238E27FC236}">
+                <a16:creationId xmlns:a16="http://schemas.microsoft.com/office/drawing/2014/main" id="{0078B38F-3EB6-4D79-AA75-7F8A31D3848F}"/>
+              </a:ext>
+            </a:extLst>
+          </p:cNvPr>
+          <p:cNvPicPr>
+            <a:picLocks noChangeAspect="1"/>
+          </p:cNvPicPr>
+          <p:nvPr/>
+        </p:nvPicPr>
+        <p:blipFill>
+          <a:blip r:embed="rId2">
+            <a:extLst>
+              <a:ext uri="{28A0092B-C50C-407E-A947-70E740481C1C}">
+                <a14:useLocalDpi xmlns:a14="http://schemas.microsoft.com/office/drawing/2010/main" val="0"/>
+              </a:ext>
+            </a:extLst>
+          </a:blip>
+          <a:stretch>
+            <a:fillRect/>
+          </a:stretch>
+        </p:blipFill>
+        <p:spPr>
+          <a:xfrm>
+            <a:off x="4291806" y="3089155"/>
+            <a:ext cx="3317201" cy="3676650"/>
+          </a:xfrm>
+          <a:prstGeom prst="rect">
+            <a:avLst/>
+          </a:prstGeom>
+          <a:ln>
+            <a:solidFill>
+              <a:schemeClr val="tx1"/>
+            </a:solidFill>
+          </a:ln>
+        </p:spPr>
+        <p:style>
+          <a:lnRef idx="2">
+            <a:schemeClr val="dk1"/>
+          </a:lnRef>
+          <a:fillRef idx="1">
+            <a:schemeClr val="lt1"/>
+          </a:fillRef>
+          <a:effectRef idx="0">
+            <a:schemeClr val="dk1"/>
+          </a:effectRef>
+          <a:fontRef idx="minor">
+            <a:schemeClr val="dk1"/>
+          </a:fontRef>
+        </p:style>
+      </p:pic>
     </p:spTree>
     <p:extLst>
       <p:ext uri="{BB962C8B-B14F-4D97-AF65-F5344CB8AC3E}">
@@ -5518,8 +5604,8 @@
         </p:nvSpPr>
         <p:spPr>
           <a:xfrm>
-            <a:off x="684212" y="2192867"/>
-            <a:ext cx="8828756" cy="3615267"/>
+            <a:off x="684211" y="2192868"/>
+            <a:ext cx="9711540" cy="3737416"/>
           </a:xfrm>
         </p:spPr>
         <p:txBody>
@@ -5530,7 +5616,7 @@
           <a:p>
             <a:r>
               <a:rPr lang="en-US" sz="2800" dirty="0"/>
-              <a:t>SPA</a:t>
+              <a:t>S.P.A</a:t>
             </a:r>
             <a:r>
               <a:rPr lang="he-IL" sz="2800" dirty="0"/>
@@ -5538,25 +5624,25 @@
             </a:r>
             <a:r>
               <a:rPr lang="en-US" sz="2800" dirty="0"/>
-              <a:t>is a virtual electronic store developed by 3 student from the faculty of computer science, Holon institute of technology</a:t>
+              <a:t>is a virtual electronic store developed by 3 students from the faculty of computer science, Holon Institute of Technology</a:t>
             </a:r>
           </a:p>
           <a:p>
             <a:r>
               <a:rPr lang="en-US" sz="2800" dirty="0"/>
-              <a:t>We created a friendly desktop application with easy to use interface for both the users and the management</a:t>
+              <a:t>We created a friendly desktop application with easy to use interface for both the users and the management of an electronic store</a:t>
             </a:r>
           </a:p>
           <a:p>
             <a:r>
               <a:rPr lang="en-US" sz="2800" dirty="0"/>
-              <a:t>We developed the application using JAVA language </a:t>
+              <a:t>We developed the application using Java language with Swing framework</a:t>
             </a:r>
           </a:p>
           <a:p>
             <a:r>
               <a:rPr lang="en-US" sz="2800" dirty="0"/>
-              <a:t>The application was develop in accordance to our architecture documents</a:t>
+              <a:t>The application was developed in accordance to our architecture documents</a:t>
             </a:r>
           </a:p>
           <a:p>
@@ -5653,24 +5739,24 @@
           </a:xfrm>
         </p:spPr>
         <p:txBody>
-          <a:bodyPr>
-            <a:normAutofit fontScale="92500"/>
+          <a:bodyPr anchor="t">
+            <a:normAutofit lnSpcReduction="10000"/>
           </a:bodyPr>
           <a:lstStyle/>
           <a:p>
             <a:r>
-              <a:rPr lang="en-US" dirty="0"/>
-              <a:t>The architecture we choose to work with in this project was MVC</a:t>
-            </a:r>
-            <a:endParaRPr lang="he-IL" dirty="0"/>
-          </a:p>
-          <a:p>
-            <a:endParaRPr lang="en-US" dirty="0"/>
-          </a:p>
-          <a:p>
-            <a:r>
-              <a:rPr lang="en-US" dirty="0"/>
-              <a:t>We made a separation of the model from view and controller in order to make it easier to change the model layer with a DB access in the future. Hence the business Logic is implemented at the controller layer.</a:t>
+              <a:rPr lang="en-US"/>
+              <a:t>The architecture we chose to work with in this project is MVC</a:t>
+            </a:r>
+            <a:endParaRPr lang="he-IL"/>
+          </a:p>
+          <a:p>
+            <a:endParaRPr lang="en-US"/>
+          </a:p>
+          <a:p>
+            <a:r>
+              <a:rPr lang="en-US"/>
+              <a:t>We made a separation of the model from view and controller in order to make it easier to change the model layer with a DB access in the future. Hence the business logic is implemented at the controller layer.</a:t>
             </a:r>
           </a:p>
           <a:p>
@@ -5718,6 +5804,287 @@
     <p:extLst>
       <p:ext uri="{BB962C8B-B14F-4D97-AF65-F5344CB8AC3E}">
         <p14:creationId xmlns:p14="http://schemas.microsoft.com/office/powerpoint/2010/main" val="2534879713"/>
+      </p:ext>
+    </p:extLst>
+  </p:cSld>
+  <p:clrMapOvr>
+    <a:masterClrMapping/>
+  </p:clrMapOvr>
+</p:sld>
+</file>
+
+<file path=ppt/slides/slide4.xml><?xml version="1.0" encoding="utf-8"?>
+<p:sld xmlns:a="http://schemas.openxmlformats.org/drawingml/2006/main" xmlns:r="http://schemas.openxmlformats.org/officeDocument/2006/relationships" xmlns:p="http://schemas.openxmlformats.org/presentationml/2006/main">
+  <p:cSld>
+    <p:spTree>
+      <p:nvGrpSpPr>
+        <p:cNvPr id="1" name=""/>
+        <p:cNvGrpSpPr/>
+        <p:nvPr/>
+      </p:nvGrpSpPr>
+      <p:grpSpPr>
+        <a:xfrm>
+          <a:off x="0" y="0"/>
+          <a:ext cx="0" cy="0"/>
+          <a:chOff x="0" y="0"/>
+          <a:chExt cx="0" cy="0"/>
+        </a:xfrm>
+      </p:grpSpPr>
+      <p:sp>
+        <p:nvSpPr>
+          <p:cNvPr id="2" name="Title 1">
+            <a:extLst>
+              <a:ext uri="{FF2B5EF4-FFF2-40B4-BE49-F238E27FC236}">
+                <a16:creationId xmlns:a16="http://schemas.microsoft.com/office/drawing/2014/main" id="{9B82A3CD-65EE-421B-824A-58ED14F9C3C1}"/>
+              </a:ext>
+            </a:extLst>
+          </p:cNvPr>
+          <p:cNvSpPr>
+            <a:spLocks noGrp="1"/>
+          </p:cNvSpPr>
+          <p:nvPr>
+            <p:ph type="title"/>
+          </p:nvPr>
+        </p:nvSpPr>
+        <p:spPr>
+          <a:xfrm>
+            <a:off x="684211" y="685800"/>
+            <a:ext cx="9676029" cy="1507067"/>
+          </a:xfrm>
+        </p:spPr>
+        <p:txBody>
+          <a:bodyPr>
+            <a:normAutofit/>
+          </a:bodyPr>
+          <a:lstStyle/>
+          <a:p>
+            <a:r>
+              <a:rPr lang="en-US" sz="6000" dirty="0"/>
+              <a:t>The architecture CONT.</a:t>
+            </a:r>
+          </a:p>
+        </p:txBody>
+      </p:sp>
+      <p:sp>
+        <p:nvSpPr>
+          <p:cNvPr id="3" name="Content Placeholder 2">
+            <a:extLst>
+              <a:ext uri="{FF2B5EF4-FFF2-40B4-BE49-F238E27FC236}">
+                <a16:creationId xmlns:a16="http://schemas.microsoft.com/office/drawing/2014/main" id="{E4410710-75A9-43F4-A500-D3465ED5F1AF}"/>
+              </a:ext>
+            </a:extLst>
+          </p:cNvPr>
+          <p:cNvSpPr>
+            <a:spLocks noGrp="1"/>
+          </p:cNvSpPr>
+          <p:nvPr>
+            <p:ph idx="1"/>
+          </p:nvPr>
+        </p:nvSpPr>
+        <p:spPr>
+          <a:xfrm>
+            <a:off x="684212" y="2192867"/>
+            <a:ext cx="4422543" cy="3615267"/>
+          </a:xfrm>
+        </p:spPr>
+        <p:txBody>
+          <a:bodyPr anchor="t">
+            <a:normAutofit/>
+          </a:bodyPr>
+          <a:lstStyle/>
+          <a:p>
+            <a:r>
+              <a:rPr lang="en-US" dirty="0"/>
+              <a:t>The data access is implemented using the Repository pattern, such that there is a single data source for reading and persisting data.</a:t>
+            </a:r>
+          </a:p>
+        </p:txBody>
+      </p:sp>
+      <p:pic>
+        <p:nvPicPr>
+          <p:cNvPr id="7" name="Picture 6">
+            <a:extLst>
+              <a:ext uri="{FF2B5EF4-FFF2-40B4-BE49-F238E27FC236}">
+                <a16:creationId xmlns:a16="http://schemas.microsoft.com/office/drawing/2014/main" id="{96EA0C31-B6EB-43C7-B620-1C76F5FF98C7}"/>
+              </a:ext>
+            </a:extLst>
+          </p:cNvPr>
+          <p:cNvPicPr>
+            <a:picLocks noChangeAspect="1"/>
+          </p:cNvPicPr>
+          <p:nvPr/>
+        </p:nvPicPr>
+        <p:blipFill>
+          <a:blip r:embed="rId2">
+            <a:extLst>
+              <a:ext uri="{28A0092B-C50C-407E-A947-70E740481C1C}">
+                <a14:useLocalDpi xmlns:a14="http://schemas.microsoft.com/office/drawing/2010/main" val="0"/>
+              </a:ext>
+            </a:extLst>
+          </a:blip>
+          <a:srcRect/>
+          <a:stretch/>
+        </p:blipFill>
+        <p:spPr>
+          <a:xfrm>
+            <a:off x="5106755" y="2002631"/>
+            <a:ext cx="6784704" cy="4683404"/>
+          </a:xfrm>
+          <a:prstGeom prst="rect">
+            <a:avLst/>
+          </a:prstGeom>
+        </p:spPr>
+      </p:pic>
+    </p:spTree>
+    <p:extLst>
+      <p:ext uri="{BB962C8B-B14F-4D97-AF65-F5344CB8AC3E}">
+        <p14:creationId xmlns:p14="http://schemas.microsoft.com/office/powerpoint/2010/main" val="2519521415"/>
+      </p:ext>
+    </p:extLst>
+  </p:cSld>
+  <p:clrMapOvr>
+    <a:masterClrMapping/>
+  </p:clrMapOvr>
+</p:sld>
+</file>
+
+<file path=ppt/slides/slide5.xml><?xml version="1.0" encoding="utf-8"?>
+<p:sld xmlns:a="http://schemas.openxmlformats.org/drawingml/2006/main" xmlns:r="http://schemas.openxmlformats.org/officeDocument/2006/relationships" xmlns:p="http://schemas.openxmlformats.org/presentationml/2006/main">
+  <p:cSld>
+    <p:spTree>
+      <p:nvGrpSpPr>
+        <p:cNvPr id="1" name=""/>
+        <p:cNvGrpSpPr/>
+        <p:nvPr/>
+      </p:nvGrpSpPr>
+      <p:grpSpPr>
+        <a:xfrm>
+          <a:off x="0" y="0"/>
+          <a:ext cx="0" cy="0"/>
+          <a:chOff x="0" y="0"/>
+          <a:chExt cx="0" cy="0"/>
+        </a:xfrm>
+      </p:grpSpPr>
+      <p:sp>
+        <p:nvSpPr>
+          <p:cNvPr id="2" name="Title 1">
+            <a:extLst>
+              <a:ext uri="{FF2B5EF4-FFF2-40B4-BE49-F238E27FC236}">
+                <a16:creationId xmlns:a16="http://schemas.microsoft.com/office/drawing/2014/main" id="{9B82A3CD-65EE-421B-824A-58ED14F9C3C1}"/>
+              </a:ext>
+            </a:extLst>
+          </p:cNvPr>
+          <p:cNvSpPr>
+            <a:spLocks noGrp="1"/>
+          </p:cNvSpPr>
+          <p:nvPr>
+            <p:ph type="title"/>
+          </p:nvPr>
+        </p:nvSpPr>
+        <p:spPr>
+          <a:xfrm>
+            <a:off x="684211" y="685800"/>
+            <a:ext cx="9676029" cy="1507067"/>
+          </a:xfrm>
+        </p:spPr>
+        <p:txBody>
+          <a:bodyPr>
+            <a:normAutofit/>
+          </a:bodyPr>
+          <a:lstStyle/>
+          <a:p>
+            <a:r>
+              <a:rPr lang="en-US" sz="6000" dirty="0"/>
+              <a:t>DESIGN PATTERNS</a:t>
+            </a:r>
+          </a:p>
+        </p:txBody>
+      </p:sp>
+      <p:sp>
+        <p:nvSpPr>
+          <p:cNvPr id="3" name="Content Placeholder 2">
+            <a:extLst>
+              <a:ext uri="{FF2B5EF4-FFF2-40B4-BE49-F238E27FC236}">
+                <a16:creationId xmlns:a16="http://schemas.microsoft.com/office/drawing/2014/main" id="{E4410710-75A9-43F4-A500-D3465ED5F1AF}"/>
+              </a:ext>
+            </a:extLst>
+          </p:cNvPr>
+          <p:cNvSpPr>
+            <a:spLocks noGrp="1"/>
+          </p:cNvSpPr>
+          <p:nvPr>
+            <p:ph idx="1"/>
+          </p:nvPr>
+        </p:nvSpPr>
+        <p:spPr>
+          <a:xfrm>
+            <a:off x="684212" y="2192867"/>
+            <a:ext cx="9951237" cy="4065890"/>
+          </a:xfrm>
+        </p:spPr>
+        <p:txBody>
+          <a:bodyPr anchor="t">
+            <a:normAutofit/>
+          </a:bodyPr>
+          <a:lstStyle/>
+          <a:p>
+            <a:r>
+              <a:rPr lang="en-US" dirty="0"/>
+              <a:t>Observer</a:t>
+            </a:r>
+          </a:p>
+          <a:p>
+            <a:pPr lvl="1"/>
+            <a:r>
+              <a:rPr lang="en-US" dirty="0"/>
+              <a:t>Used by various systems in order to notify listeners (at the view level) about updates of the model.</a:t>
+            </a:r>
+          </a:p>
+          <a:p>
+            <a:r>
+              <a:rPr lang="en-US" dirty="0"/>
+              <a:t>Command</a:t>
+            </a:r>
+          </a:p>
+          <a:p>
+            <a:pPr lvl="1"/>
+            <a:r>
+              <a:rPr lang="en-US" dirty="0"/>
+              <a:t>Actions in the application are separated into classes with single responsibility according to the Command pattern.</a:t>
+            </a:r>
+          </a:p>
+          <a:p>
+            <a:r>
+              <a:rPr lang="en-US" dirty="0"/>
+              <a:t>Factory Method</a:t>
+            </a:r>
+          </a:p>
+          <a:p>
+            <a:pPr lvl="1"/>
+            <a:r>
+              <a:rPr lang="en-US" dirty="0"/>
+              <a:t>Concrete actions are created by using the Factory Method pattern</a:t>
+            </a:r>
+          </a:p>
+          <a:p>
+            <a:r>
+              <a:rPr lang="en-US" dirty="0"/>
+              <a:t>Singleton</a:t>
+            </a:r>
+          </a:p>
+          <a:p>
+            <a:pPr lvl="1"/>
+            <a:r>
+              <a:rPr lang="en-US" dirty="0"/>
+              <a:t>Maintain unique instance of sub-systems within one singleton class</a:t>
+            </a:r>
+          </a:p>
+        </p:txBody>
+      </p:sp>
+    </p:spTree>
+    <p:extLst>
+      <p:ext uri="{BB962C8B-B14F-4D97-AF65-F5344CB8AC3E}">
+        <p14:creationId xmlns:p14="http://schemas.microsoft.com/office/powerpoint/2010/main" val="135497302"/>
       </p:ext>
     </p:extLst>
   </p:cSld>

</xml_diff>

<commit_message>
Add links to the presentation
</commit_message>
<xml_diff>
--- a/Project presentation/SPA-Presentation.pptx
+++ b/Project presentation/SPA-Presentation.pptx
@@ -10,6 +10,7 @@
     <p:sldId id="260" r:id="rId4"/>
     <p:sldId id="262" r:id="rId5"/>
     <p:sldId id="263" r:id="rId6"/>
+    <p:sldId id="264" r:id="rId7"/>
   </p:sldIdLst>
   <p:sldSz cx="12192000" cy="6858000"/>
   <p:notesSz cx="6858000" cy="9144000"/>
@@ -307,7 +308,7 @@
           <a:p>
             <a:fld id="{8048F7A8-0824-48EB-B124-DB066AAF77DC}" type="datetimeFigureOut">
               <a:rPr lang="en-US" smtClean="0"/>
-              <a:t>08-Jul-20</a:t>
+              <a:t>09-Jul-20</a:t>
             </a:fld>
             <a:endParaRPr lang="en-US"/>
           </a:p>
@@ -743,7 +744,7 @@
           <a:p>
             <a:fld id="{8048F7A8-0824-48EB-B124-DB066AAF77DC}" type="datetimeFigureOut">
               <a:rPr lang="en-US" smtClean="0"/>
-              <a:t>08-Jul-20</a:t>
+              <a:t>09-Jul-20</a:t>
             </a:fld>
             <a:endParaRPr lang="en-US"/>
           </a:p>
@@ -993,7 +994,7 @@
           <a:p>
             <a:fld id="{8048F7A8-0824-48EB-B124-DB066AAF77DC}" type="datetimeFigureOut">
               <a:rPr lang="en-US" smtClean="0"/>
-              <a:t>08-Jul-20</a:t>
+              <a:t>09-Jul-20</a:t>
             </a:fld>
             <a:endParaRPr lang="en-US"/>
           </a:p>
@@ -1301,7 +1302,7 @@
           <a:p>
             <a:fld id="{8048F7A8-0824-48EB-B124-DB066AAF77DC}" type="datetimeFigureOut">
               <a:rPr lang="en-US" smtClean="0"/>
-              <a:t>08-Jul-20</a:t>
+              <a:t>09-Jul-20</a:t>
             </a:fld>
             <a:endParaRPr lang="en-US"/>
           </a:p>
@@ -1619,7 +1620,7 @@
           <a:p>
             <a:fld id="{8048F7A8-0824-48EB-B124-DB066AAF77DC}" type="datetimeFigureOut">
               <a:rPr lang="en-US" smtClean="0"/>
-              <a:t>08-Jul-20</a:t>
+              <a:t>09-Jul-20</a:t>
             </a:fld>
             <a:endParaRPr lang="en-US"/>
           </a:p>
@@ -1921,7 +1922,7 @@
           <a:p>
             <a:fld id="{8048F7A8-0824-48EB-B124-DB066AAF77DC}" type="datetimeFigureOut">
               <a:rPr lang="en-US" smtClean="0"/>
-              <a:t>08-Jul-20</a:t>
+              <a:t>09-Jul-20</a:t>
             </a:fld>
             <a:endParaRPr lang="en-US"/>
           </a:p>
@@ -2288,7 +2289,7 @@
           <a:p>
             <a:fld id="{8048F7A8-0824-48EB-B124-DB066AAF77DC}" type="datetimeFigureOut">
               <a:rPr lang="en-US" smtClean="0"/>
-              <a:t>08-Jul-20</a:t>
+              <a:t>09-Jul-20</a:t>
             </a:fld>
             <a:endParaRPr lang="en-US"/>
           </a:p>
@@ -2462,7 +2463,7 @@
           <a:p>
             <a:fld id="{8048F7A8-0824-48EB-B124-DB066AAF77DC}" type="datetimeFigureOut">
               <a:rPr lang="en-US" smtClean="0"/>
-              <a:t>08-Jul-20</a:t>
+              <a:t>09-Jul-20</a:t>
             </a:fld>
             <a:endParaRPr lang="en-US"/>
           </a:p>
@@ -2642,7 +2643,7 @@
           <a:p>
             <a:fld id="{8048F7A8-0824-48EB-B124-DB066AAF77DC}" type="datetimeFigureOut">
               <a:rPr lang="en-US" smtClean="0"/>
-              <a:t>08-Jul-20</a:t>
+              <a:t>09-Jul-20</a:t>
             </a:fld>
             <a:endParaRPr lang="en-US"/>
           </a:p>
@@ -2812,7 +2813,7 @@
           <a:p>
             <a:fld id="{8048F7A8-0824-48EB-B124-DB066AAF77DC}" type="datetimeFigureOut">
               <a:rPr lang="en-US" smtClean="0"/>
-              <a:t>08-Jul-20</a:t>
+              <a:t>09-Jul-20</a:t>
             </a:fld>
             <a:endParaRPr lang="en-US"/>
           </a:p>
@@ -3062,7 +3063,7 @@
           <a:p>
             <a:fld id="{8048F7A8-0824-48EB-B124-DB066AAF77DC}" type="datetimeFigureOut">
               <a:rPr lang="en-US" smtClean="0"/>
-              <a:t>08-Jul-20</a:t>
+              <a:t>09-Jul-20</a:t>
             </a:fld>
             <a:endParaRPr lang="en-US"/>
           </a:p>
@@ -3298,7 +3299,7 @@
           <a:p>
             <a:fld id="{8048F7A8-0824-48EB-B124-DB066AAF77DC}" type="datetimeFigureOut">
               <a:rPr lang="en-US" smtClean="0"/>
-              <a:t>08-Jul-20</a:t>
+              <a:t>09-Jul-20</a:t>
             </a:fld>
             <a:endParaRPr lang="en-US"/>
           </a:p>
@@ -3680,7 +3681,7 @@
           <a:p>
             <a:fld id="{8048F7A8-0824-48EB-B124-DB066AAF77DC}" type="datetimeFigureOut">
               <a:rPr lang="en-US" smtClean="0"/>
-              <a:t>08-Jul-20</a:t>
+              <a:t>09-Jul-20</a:t>
             </a:fld>
             <a:endParaRPr lang="en-US"/>
           </a:p>
@@ -3798,7 +3799,7 @@
           <a:p>
             <a:fld id="{8048F7A8-0824-48EB-B124-DB066AAF77DC}" type="datetimeFigureOut">
               <a:rPr lang="en-US" smtClean="0"/>
-              <a:t>08-Jul-20</a:t>
+              <a:t>09-Jul-20</a:t>
             </a:fld>
             <a:endParaRPr lang="en-US"/>
           </a:p>
@@ -3893,7 +3894,7 @@
           <a:p>
             <a:fld id="{8048F7A8-0824-48EB-B124-DB066AAF77DC}" type="datetimeFigureOut">
               <a:rPr lang="en-US" smtClean="0"/>
-              <a:t>08-Jul-20</a:t>
+              <a:t>09-Jul-20</a:t>
             </a:fld>
             <a:endParaRPr lang="en-US"/>
           </a:p>
@@ -4148,7 +4149,7 @@
           <a:p>
             <a:fld id="{8048F7A8-0824-48EB-B124-DB066AAF77DC}" type="datetimeFigureOut">
               <a:rPr lang="en-US" smtClean="0"/>
-              <a:t>08-Jul-20</a:t>
+              <a:t>09-Jul-20</a:t>
             </a:fld>
             <a:endParaRPr lang="en-US"/>
           </a:p>
@@ -4431,7 +4432,7 @@
           <a:p>
             <a:fld id="{8048F7A8-0824-48EB-B124-DB066AAF77DC}" type="datetimeFigureOut">
               <a:rPr lang="en-US" smtClean="0"/>
-              <a:t>08-Jul-20</a:t>
+              <a:t>09-Jul-20</a:t>
             </a:fld>
             <a:endParaRPr lang="en-US"/>
           </a:p>
@@ -4837,7 +4838,7 @@
           <a:p>
             <a:fld id="{8048F7A8-0824-48EB-B124-DB066AAF77DC}" type="datetimeFigureOut">
               <a:rPr lang="en-US" smtClean="0"/>
-              <a:t>08-Jul-20</a:t>
+              <a:t>09-Jul-20</a:t>
             </a:fld>
             <a:endParaRPr lang="en-US"/>
           </a:p>
@@ -5425,8 +5426,8 @@
         </p:nvSpPr>
         <p:spPr>
           <a:xfrm>
-            <a:off x="684212" y="2266950"/>
-            <a:ext cx="7215188" cy="1128183"/>
+            <a:off x="684212" y="2266951"/>
+            <a:ext cx="7215188" cy="973400"/>
           </a:xfrm>
         </p:spPr>
         <p:txBody>
@@ -5521,6 +5522,280 @@
           </a:fontRef>
         </p:style>
       </p:pic>
+      <p:sp>
+        <p:nvSpPr>
+          <p:cNvPr id="6" name="Subtitle 2">
+            <a:extLst>
+              <a:ext uri="{FF2B5EF4-FFF2-40B4-BE49-F238E27FC236}">
+                <a16:creationId xmlns:a16="http://schemas.microsoft.com/office/drawing/2014/main" id="{8CBAA8AF-4E43-4A7B-8F3C-E9CD182922E2}"/>
+              </a:ext>
+            </a:extLst>
+          </p:cNvPr>
+          <p:cNvSpPr txBox="1">
+            <a:spLocks/>
+          </p:cNvSpPr>
+          <p:nvPr/>
+        </p:nvSpPr>
+        <p:spPr>
+          <a:xfrm>
+            <a:off x="684212" y="2942300"/>
+            <a:ext cx="3221963" cy="3236558"/>
+          </a:xfrm>
+          <a:prstGeom prst="rect">
+            <a:avLst/>
+          </a:prstGeom>
+        </p:spPr>
+        <p:txBody>
+          <a:bodyPr vert="horz" lIns="91440" tIns="45720" rIns="91440" bIns="45720" rtlCol="0" anchor="t">
+            <a:normAutofit/>
+          </a:bodyPr>
+          <a:lstStyle>
+            <a:lvl1pPr marL="0" indent="0" algn="l" defTabSz="457200" rtl="0" eaLnBrk="1" latinLnBrk="0" hangingPunct="1">
+              <a:spcBef>
+                <a:spcPct val="20000"/>
+              </a:spcBef>
+              <a:spcAft>
+                <a:spcPts val="600"/>
+              </a:spcAft>
+              <a:buClr>
+                <a:schemeClr val="tx1"/>
+              </a:buClr>
+              <a:buSzPct val="80000"/>
+              <a:buFont typeface="Wingdings 3" panose="05040102010807070707" pitchFamily="18" charset="2"/>
+              <a:buNone/>
+              <a:defRPr sz="2100" kern="1200" cap="none">
+                <a:solidFill>
+                  <a:schemeClr val="bg2">
+                    <a:lumMod val="75000"/>
+                  </a:schemeClr>
+                </a:solidFill>
+                <a:effectLst/>
+                <a:latin typeface="+mn-lt"/>
+                <a:ea typeface="+mn-ea"/>
+                <a:cs typeface="+mn-cs"/>
+              </a:defRPr>
+            </a:lvl1pPr>
+            <a:lvl2pPr marL="457200" indent="0" algn="ctr" defTabSz="457200" rtl="0" eaLnBrk="1" latinLnBrk="0" hangingPunct="1">
+              <a:spcBef>
+                <a:spcPct val="20000"/>
+              </a:spcBef>
+              <a:spcAft>
+                <a:spcPts val="600"/>
+              </a:spcAft>
+              <a:buClr>
+                <a:schemeClr val="tx1"/>
+              </a:buClr>
+              <a:buSzPct val="80000"/>
+              <a:buFont typeface="Wingdings 3" panose="05040102010807070707" pitchFamily="18" charset="2"/>
+              <a:buNone/>
+              <a:defRPr sz="1800" kern="1200" cap="none">
+                <a:solidFill>
+                  <a:schemeClr val="tx1">
+                    <a:tint val="75000"/>
+                  </a:schemeClr>
+                </a:solidFill>
+                <a:effectLst/>
+                <a:latin typeface="+mn-lt"/>
+                <a:ea typeface="+mn-ea"/>
+                <a:cs typeface="+mn-cs"/>
+              </a:defRPr>
+            </a:lvl2pPr>
+            <a:lvl3pPr marL="914400" indent="0" algn="ctr" defTabSz="457200" rtl="0" eaLnBrk="1" latinLnBrk="0" hangingPunct="1">
+              <a:spcBef>
+                <a:spcPct val="20000"/>
+              </a:spcBef>
+              <a:spcAft>
+                <a:spcPts val="600"/>
+              </a:spcAft>
+              <a:buClr>
+                <a:schemeClr val="tx1"/>
+              </a:buClr>
+              <a:buSzPct val="80000"/>
+              <a:buFont typeface="Wingdings 3" panose="05040102010807070707" pitchFamily="18" charset="2"/>
+              <a:buNone/>
+              <a:defRPr sz="1600" kern="1200" cap="none">
+                <a:solidFill>
+                  <a:schemeClr val="tx1">
+                    <a:tint val="75000"/>
+                  </a:schemeClr>
+                </a:solidFill>
+                <a:effectLst/>
+                <a:latin typeface="+mn-lt"/>
+                <a:ea typeface="+mn-ea"/>
+                <a:cs typeface="+mn-cs"/>
+              </a:defRPr>
+            </a:lvl3pPr>
+            <a:lvl4pPr marL="1371600" indent="0" algn="ctr" defTabSz="457200" rtl="0" eaLnBrk="1" latinLnBrk="0" hangingPunct="1">
+              <a:spcBef>
+                <a:spcPct val="20000"/>
+              </a:spcBef>
+              <a:spcAft>
+                <a:spcPts val="600"/>
+              </a:spcAft>
+              <a:buClr>
+                <a:schemeClr val="tx1"/>
+              </a:buClr>
+              <a:buSzPct val="80000"/>
+              <a:buFont typeface="Wingdings 3" panose="05040102010807070707" pitchFamily="18" charset="2"/>
+              <a:buNone/>
+              <a:defRPr sz="1400" kern="1200" cap="none">
+                <a:solidFill>
+                  <a:schemeClr val="tx1">
+                    <a:tint val="75000"/>
+                  </a:schemeClr>
+                </a:solidFill>
+                <a:effectLst/>
+                <a:latin typeface="+mn-lt"/>
+                <a:ea typeface="+mn-ea"/>
+                <a:cs typeface="+mn-cs"/>
+              </a:defRPr>
+            </a:lvl4pPr>
+            <a:lvl5pPr marL="1828800" indent="0" algn="ctr" defTabSz="457200" rtl="0" eaLnBrk="1" latinLnBrk="0" hangingPunct="1">
+              <a:spcBef>
+                <a:spcPct val="20000"/>
+              </a:spcBef>
+              <a:spcAft>
+                <a:spcPts val="600"/>
+              </a:spcAft>
+              <a:buClr>
+                <a:schemeClr val="tx1"/>
+              </a:buClr>
+              <a:buSzPct val="80000"/>
+              <a:buFont typeface="Wingdings 3" panose="05040102010807070707" pitchFamily="18" charset="2"/>
+              <a:buNone/>
+              <a:defRPr sz="1400" kern="1200" cap="none">
+                <a:solidFill>
+                  <a:schemeClr val="tx1">
+                    <a:tint val="75000"/>
+                  </a:schemeClr>
+                </a:solidFill>
+                <a:effectLst/>
+                <a:latin typeface="+mn-lt"/>
+                <a:ea typeface="+mn-ea"/>
+                <a:cs typeface="+mn-cs"/>
+              </a:defRPr>
+            </a:lvl5pPr>
+            <a:lvl6pPr marL="2286000" indent="0" algn="ctr" defTabSz="457200" rtl="0" eaLnBrk="1" latinLnBrk="0" hangingPunct="1">
+              <a:spcBef>
+                <a:spcPct val="20000"/>
+              </a:spcBef>
+              <a:spcAft>
+                <a:spcPts val="600"/>
+              </a:spcAft>
+              <a:buClr>
+                <a:schemeClr val="tx1"/>
+              </a:buClr>
+              <a:buSzPct val="80000"/>
+              <a:buFont typeface="Wingdings 3" panose="05040102010807070707" pitchFamily="18" charset="2"/>
+              <a:buNone/>
+              <a:defRPr sz="1400" kern="1200" cap="none">
+                <a:solidFill>
+                  <a:schemeClr val="tx1">
+                    <a:tint val="75000"/>
+                  </a:schemeClr>
+                </a:solidFill>
+                <a:effectLst/>
+                <a:latin typeface="+mn-lt"/>
+                <a:ea typeface="+mn-ea"/>
+                <a:cs typeface="+mn-cs"/>
+              </a:defRPr>
+            </a:lvl6pPr>
+            <a:lvl7pPr marL="2743200" indent="0" algn="ctr" defTabSz="457200" rtl="0" eaLnBrk="1" latinLnBrk="0" hangingPunct="1">
+              <a:spcBef>
+                <a:spcPct val="20000"/>
+              </a:spcBef>
+              <a:spcAft>
+                <a:spcPts val="600"/>
+              </a:spcAft>
+              <a:buClr>
+                <a:schemeClr val="tx1"/>
+              </a:buClr>
+              <a:buSzPct val="80000"/>
+              <a:buFont typeface="Wingdings 3" panose="05040102010807070707" pitchFamily="18" charset="2"/>
+              <a:buNone/>
+              <a:defRPr sz="1400" kern="1200" cap="none">
+                <a:solidFill>
+                  <a:schemeClr val="tx1">
+                    <a:tint val="75000"/>
+                  </a:schemeClr>
+                </a:solidFill>
+                <a:effectLst/>
+                <a:latin typeface="+mn-lt"/>
+                <a:ea typeface="+mn-ea"/>
+                <a:cs typeface="+mn-cs"/>
+              </a:defRPr>
+            </a:lvl7pPr>
+            <a:lvl8pPr marL="3200400" indent="0" algn="ctr" defTabSz="457200" rtl="0" eaLnBrk="1" latinLnBrk="0" hangingPunct="1">
+              <a:spcBef>
+                <a:spcPct val="20000"/>
+              </a:spcBef>
+              <a:spcAft>
+                <a:spcPts val="600"/>
+              </a:spcAft>
+              <a:buClr>
+                <a:schemeClr val="tx1"/>
+              </a:buClr>
+              <a:buSzPct val="80000"/>
+              <a:buFont typeface="Wingdings 3" panose="05040102010807070707" pitchFamily="18" charset="2"/>
+              <a:buNone/>
+              <a:defRPr sz="1400" kern="1200" cap="none">
+                <a:solidFill>
+                  <a:schemeClr val="tx1">
+                    <a:tint val="75000"/>
+                  </a:schemeClr>
+                </a:solidFill>
+                <a:effectLst/>
+                <a:latin typeface="+mn-lt"/>
+                <a:ea typeface="+mn-ea"/>
+                <a:cs typeface="+mn-cs"/>
+              </a:defRPr>
+            </a:lvl8pPr>
+            <a:lvl9pPr marL="3657600" indent="0" algn="ctr" defTabSz="457200" rtl="0" eaLnBrk="1" latinLnBrk="0" hangingPunct="1">
+              <a:spcBef>
+                <a:spcPct val="20000"/>
+              </a:spcBef>
+              <a:spcAft>
+                <a:spcPts val="600"/>
+              </a:spcAft>
+              <a:buClr>
+                <a:schemeClr val="tx1"/>
+              </a:buClr>
+              <a:buSzPct val="80000"/>
+              <a:buFont typeface="Wingdings 3" panose="05040102010807070707" pitchFamily="18" charset="2"/>
+              <a:buNone/>
+              <a:defRPr sz="1400" kern="1200" cap="none">
+                <a:solidFill>
+                  <a:schemeClr val="tx1">
+                    <a:tint val="75000"/>
+                  </a:schemeClr>
+                </a:solidFill>
+                <a:effectLst/>
+                <a:latin typeface="+mn-lt"/>
+                <a:ea typeface="+mn-ea"/>
+                <a:cs typeface="+mn-cs"/>
+              </a:defRPr>
+            </a:lvl9pPr>
+          </a:lstStyle>
+          <a:p>
+            <a:r>
+              <a:rPr lang="en-US" sz="2000" dirty="0"/>
+              <a:t>Final Project</a:t>
+            </a:r>
+          </a:p>
+          <a:p>
+            <a:r>
+              <a:rPr lang="en-US" sz="2000" dirty="0"/>
+              <a:t>Software Engineering</a:t>
+            </a:r>
+          </a:p>
+          <a:p>
+            <a:r>
+              <a:rPr lang="en-US" sz="2000" dirty="0"/>
+              <a:t>HIT, 2020</a:t>
+            </a:r>
+          </a:p>
+        </p:txBody>
+      </p:sp>
     </p:spTree>
     <p:extLst>
       <p:ext uri="{BB962C8B-B14F-4D97-AF65-F5344CB8AC3E}">
@@ -6085,6 +6360,158 @@
     <p:extLst>
       <p:ext uri="{BB962C8B-B14F-4D97-AF65-F5344CB8AC3E}">
         <p14:creationId xmlns:p14="http://schemas.microsoft.com/office/powerpoint/2010/main" val="135497302"/>
+      </p:ext>
+    </p:extLst>
+  </p:cSld>
+  <p:clrMapOvr>
+    <a:masterClrMapping/>
+  </p:clrMapOvr>
+</p:sld>
+</file>
+
+<file path=ppt/slides/slide6.xml><?xml version="1.0" encoding="utf-8"?>
+<p:sld xmlns:a="http://schemas.openxmlformats.org/drawingml/2006/main" xmlns:r="http://schemas.openxmlformats.org/officeDocument/2006/relationships" xmlns:p="http://schemas.openxmlformats.org/presentationml/2006/main">
+  <p:cSld>
+    <p:spTree>
+      <p:nvGrpSpPr>
+        <p:cNvPr id="1" name=""/>
+        <p:cNvGrpSpPr/>
+        <p:nvPr/>
+      </p:nvGrpSpPr>
+      <p:grpSpPr>
+        <a:xfrm>
+          <a:off x="0" y="0"/>
+          <a:ext cx="0" cy="0"/>
+          <a:chOff x="0" y="0"/>
+          <a:chExt cx="0" cy="0"/>
+        </a:xfrm>
+      </p:grpSpPr>
+      <p:sp>
+        <p:nvSpPr>
+          <p:cNvPr id="2" name="Title 1">
+            <a:extLst>
+              <a:ext uri="{FF2B5EF4-FFF2-40B4-BE49-F238E27FC236}">
+                <a16:creationId xmlns:a16="http://schemas.microsoft.com/office/drawing/2014/main" id="{9B82A3CD-65EE-421B-824A-58ED14F9C3C1}"/>
+              </a:ext>
+            </a:extLst>
+          </p:cNvPr>
+          <p:cNvSpPr>
+            <a:spLocks noGrp="1"/>
+          </p:cNvSpPr>
+          <p:nvPr>
+            <p:ph type="title"/>
+          </p:nvPr>
+        </p:nvSpPr>
+        <p:spPr>
+          <a:xfrm>
+            <a:off x="684211" y="685800"/>
+            <a:ext cx="9676029" cy="1507067"/>
+          </a:xfrm>
+        </p:spPr>
+        <p:txBody>
+          <a:bodyPr>
+            <a:normAutofit/>
+          </a:bodyPr>
+          <a:lstStyle/>
+          <a:p>
+            <a:r>
+              <a:rPr lang="en-US" sz="6000" dirty="0"/>
+              <a:t>LINKS</a:t>
+            </a:r>
+          </a:p>
+        </p:txBody>
+      </p:sp>
+      <p:sp>
+        <p:nvSpPr>
+          <p:cNvPr id="3" name="Content Placeholder 2">
+            <a:extLst>
+              <a:ext uri="{FF2B5EF4-FFF2-40B4-BE49-F238E27FC236}">
+                <a16:creationId xmlns:a16="http://schemas.microsoft.com/office/drawing/2014/main" id="{E4410710-75A9-43F4-A500-D3465ED5F1AF}"/>
+              </a:ext>
+            </a:extLst>
+          </p:cNvPr>
+          <p:cNvSpPr>
+            <a:spLocks noGrp="1"/>
+          </p:cNvSpPr>
+          <p:nvPr>
+            <p:ph idx="1"/>
+          </p:nvPr>
+        </p:nvSpPr>
+        <p:spPr>
+          <a:xfrm>
+            <a:off x="684212" y="2192867"/>
+            <a:ext cx="9951237" cy="4065890"/>
+          </a:xfrm>
+        </p:spPr>
+        <p:txBody>
+          <a:bodyPr anchor="t">
+            <a:normAutofit/>
+          </a:bodyPr>
+          <a:lstStyle/>
+          <a:p>
+            <a:r>
+              <a:rPr lang="en-US" dirty="0"/>
+              <a:t>Project source</a:t>
+            </a:r>
+          </a:p>
+          <a:p>
+            <a:pPr lvl="1"/>
+            <a:r>
+              <a:rPr lang="en-US" dirty="0">
+                <a:hlinkClick r:id="rId2"/>
+              </a:rPr>
+              <a:t>https://github.com/haimadrian/SE-Java-Project</a:t>
+            </a:r>
+            <a:endParaRPr lang="en-US" dirty="0"/>
+          </a:p>
+          <a:p>
+            <a:r>
+              <a:rPr lang="en-US" dirty="0"/>
+              <a:t>Wiki</a:t>
+            </a:r>
+          </a:p>
+          <a:p>
+            <a:pPr lvl="1"/>
+            <a:r>
+              <a:rPr lang="en-US" dirty="0">
+                <a:hlinkClick r:id="rId3"/>
+              </a:rPr>
+              <a:t>https://github.com/haimadrian/SE-Java-Project/wiki</a:t>
+            </a:r>
+            <a:endParaRPr lang="en-US" dirty="0"/>
+          </a:p>
+          <a:p>
+            <a:r>
+              <a:rPr lang="en-US" dirty="0"/>
+              <a:t>Continues Integration</a:t>
+            </a:r>
+          </a:p>
+          <a:p>
+            <a:pPr lvl="1"/>
+            <a:r>
+              <a:rPr lang="en-US" dirty="0">
+                <a:hlinkClick r:id="rId4"/>
+              </a:rPr>
+              <a:t>https://github.com/haimadrian/SE-Java-Project/actions?query=workflow%3A%22Build+SPAApplication%22</a:t>
+            </a:r>
+            <a:endParaRPr lang="en-US" dirty="0"/>
+          </a:p>
+          <a:p>
+            <a:r>
+              <a:rPr lang="en-US" dirty="0"/>
+              <a:t>Video</a:t>
+            </a:r>
+          </a:p>
+          <a:p>
+            <a:pPr lvl="1"/>
+            <a:endParaRPr lang="en-US" dirty="0"/>
+          </a:p>
+        </p:txBody>
+      </p:sp>
+    </p:spTree>
+    <p:extLst>
+      <p:ext uri="{BB962C8B-B14F-4D97-AF65-F5344CB8AC3E}">
+        <p14:creationId xmlns:p14="http://schemas.microsoft.com/office/powerpoint/2010/main" val="2679549401"/>
       </p:ext>
     </p:extLst>
   </p:cSld>

</xml_diff>

<commit_message>
Added SPA icon to ReportView
</commit_message>
<xml_diff>
--- a/Project presentation/SPA-Presentation.pptx
+++ b/Project presentation/SPA-Presentation.pptx
@@ -308,7 +308,7 @@
           <a:p>
             <a:fld id="{8048F7A8-0824-48EB-B124-DB066AAF77DC}" type="datetimeFigureOut">
               <a:rPr lang="en-US" smtClean="0"/>
-              <a:t>09-Jul-20</a:t>
+              <a:t>7/9/2020</a:t>
             </a:fld>
             <a:endParaRPr lang="en-US"/>
           </a:p>
@@ -744,7 +744,7 @@
           <a:p>
             <a:fld id="{8048F7A8-0824-48EB-B124-DB066AAF77DC}" type="datetimeFigureOut">
               <a:rPr lang="en-US" smtClean="0"/>
-              <a:t>09-Jul-20</a:t>
+              <a:t>7/9/2020</a:t>
             </a:fld>
             <a:endParaRPr lang="en-US"/>
           </a:p>
@@ -994,7 +994,7 @@
           <a:p>
             <a:fld id="{8048F7A8-0824-48EB-B124-DB066AAF77DC}" type="datetimeFigureOut">
               <a:rPr lang="en-US" smtClean="0"/>
-              <a:t>09-Jul-20</a:t>
+              <a:t>7/9/2020</a:t>
             </a:fld>
             <a:endParaRPr lang="en-US"/>
           </a:p>
@@ -1302,7 +1302,7 @@
           <a:p>
             <a:fld id="{8048F7A8-0824-48EB-B124-DB066AAF77DC}" type="datetimeFigureOut">
               <a:rPr lang="en-US" smtClean="0"/>
-              <a:t>09-Jul-20</a:t>
+              <a:t>7/9/2020</a:t>
             </a:fld>
             <a:endParaRPr lang="en-US"/>
           </a:p>
@@ -1620,7 +1620,7 @@
           <a:p>
             <a:fld id="{8048F7A8-0824-48EB-B124-DB066AAF77DC}" type="datetimeFigureOut">
               <a:rPr lang="en-US" smtClean="0"/>
-              <a:t>09-Jul-20</a:t>
+              <a:t>7/9/2020</a:t>
             </a:fld>
             <a:endParaRPr lang="en-US"/>
           </a:p>
@@ -1922,7 +1922,7 @@
           <a:p>
             <a:fld id="{8048F7A8-0824-48EB-B124-DB066AAF77DC}" type="datetimeFigureOut">
               <a:rPr lang="en-US" smtClean="0"/>
-              <a:t>09-Jul-20</a:t>
+              <a:t>7/9/2020</a:t>
             </a:fld>
             <a:endParaRPr lang="en-US"/>
           </a:p>
@@ -2289,7 +2289,7 @@
           <a:p>
             <a:fld id="{8048F7A8-0824-48EB-B124-DB066AAF77DC}" type="datetimeFigureOut">
               <a:rPr lang="en-US" smtClean="0"/>
-              <a:t>09-Jul-20</a:t>
+              <a:t>7/9/2020</a:t>
             </a:fld>
             <a:endParaRPr lang="en-US"/>
           </a:p>
@@ -2463,7 +2463,7 @@
           <a:p>
             <a:fld id="{8048F7A8-0824-48EB-B124-DB066AAF77DC}" type="datetimeFigureOut">
               <a:rPr lang="en-US" smtClean="0"/>
-              <a:t>09-Jul-20</a:t>
+              <a:t>7/9/2020</a:t>
             </a:fld>
             <a:endParaRPr lang="en-US"/>
           </a:p>
@@ -2643,7 +2643,7 @@
           <a:p>
             <a:fld id="{8048F7A8-0824-48EB-B124-DB066AAF77DC}" type="datetimeFigureOut">
               <a:rPr lang="en-US" smtClean="0"/>
-              <a:t>09-Jul-20</a:t>
+              <a:t>7/9/2020</a:t>
             </a:fld>
             <a:endParaRPr lang="en-US"/>
           </a:p>
@@ -2813,7 +2813,7 @@
           <a:p>
             <a:fld id="{8048F7A8-0824-48EB-B124-DB066AAF77DC}" type="datetimeFigureOut">
               <a:rPr lang="en-US" smtClean="0"/>
-              <a:t>09-Jul-20</a:t>
+              <a:t>7/9/2020</a:t>
             </a:fld>
             <a:endParaRPr lang="en-US"/>
           </a:p>
@@ -3063,7 +3063,7 @@
           <a:p>
             <a:fld id="{8048F7A8-0824-48EB-B124-DB066AAF77DC}" type="datetimeFigureOut">
               <a:rPr lang="en-US" smtClean="0"/>
-              <a:t>09-Jul-20</a:t>
+              <a:t>7/9/2020</a:t>
             </a:fld>
             <a:endParaRPr lang="en-US"/>
           </a:p>
@@ -3299,7 +3299,7 @@
           <a:p>
             <a:fld id="{8048F7A8-0824-48EB-B124-DB066AAF77DC}" type="datetimeFigureOut">
               <a:rPr lang="en-US" smtClean="0"/>
-              <a:t>09-Jul-20</a:t>
+              <a:t>7/9/2020</a:t>
             </a:fld>
             <a:endParaRPr lang="en-US"/>
           </a:p>
@@ -3681,7 +3681,7 @@
           <a:p>
             <a:fld id="{8048F7A8-0824-48EB-B124-DB066AAF77DC}" type="datetimeFigureOut">
               <a:rPr lang="en-US" smtClean="0"/>
-              <a:t>09-Jul-20</a:t>
+              <a:t>7/9/2020</a:t>
             </a:fld>
             <a:endParaRPr lang="en-US"/>
           </a:p>
@@ -3799,7 +3799,7 @@
           <a:p>
             <a:fld id="{8048F7A8-0824-48EB-B124-DB066AAF77DC}" type="datetimeFigureOut">
               <a:rPr lang="en-US" smtClean="0"/>
-              <a:t>09-Jul-20</a:t>
+              <a:t>7/9/2020</a:t>
             </a:fld>
             <a:endParaRPr lang="en-US"/>
           </a:p>
@@ -3894,7 +3894,7 @@
           <a:p>
             <a:fld id="{8048F7A8-0824-48EB-B124-DB066AAF77DC}" type="datetimeFigureOut">
               <a:rPr lang="en-US" smtClean="0"/>
-              <a:t>09-Jul-20</a:t>
+              <a:t>7/9/2020</a:t>
             </a:fld>
             <a:endParaRPr lang="en-US"/>
           </a:p>
@@ -4149,7 +4149,7 @@
           <a:p>
             <a:fld id="{8048F7A8-0824-48EB-B124-DB066AAF77DC}" type="datetimeFigureOut">
               <a:rPr lang="en-US" smtClean="0"/>
-              <a:t>09-Jul-20</a:t>
+              <a:t>7/9/2020</a:t>
             </a:fld>
             <a:endParaRPr lang="en-US"/>
           </a:p>
@@ -4432,7 +4432,7 @@
           <a:p>
             <a:fld id="{8048F7A8-0824-48EB-B124-DB066AAF77DC}" type="datetimeFigureOut">
               <a:rPr lang="en-US" smtClean="0"/>
-              <a:t>09-Jul-20</a:t>
+              <a:t>7/9/2020</a:t>
             </a:fld>
             <a:endParaRPr lang="en-US"/>
           </a:p>
@@ -4838,7 +4838,7 @@
           <a:p>
             <a:fld id="{8048F7A8-0824-48EB-B124-DB066AAF77DC}" type="datetimeFigureOut">
               <a:rPr lang="en-US" smtClean="0"/>
-              <a:t>09-Jul-20</a:t>
+              <a:t>7/9/2020</a:t>
             </a:fld>
             <a:endParaRPr lang="en-US"/>
           </a:p>
@@ -5495,8 +5495,8 @@
         </p:blipFill>
         <p:spPr>
           <a:xfrm>
-            <a:off x="4291806" y="3089155"/>
-            <a:ext cx="3317201" cy="3676650"/>
+            <a:off x="9273382" y="3870205"/>
+            <a:ext cx="2528094" cy="2802036"/>
           </a:xfrm>
           <a:prstGeom prst="rect">
             <a:avLst/>
@@ -5538,8 +5538,8 @@
         </p:nvSpPr>
         <p:spPr>
           <a:xfrm>
-            <a:off x="684212" y="2942300"/>
-            <a:ext cx="3221963" cy="3236558"/>
+            <a:off x="684212" y="3240350"/>
+            <a:ext cx="3897313" cy="2938507"/>
           </a:xfrm>
           <a:prstGeom prst="rect">
             <a:avLst/>
@@ -5791,7 +5791,7 @@
           <a:p>
             <a:r>
               <a:rPr lang="en-US" sz="2000" dirty="0"/>
-              <a:t>HIT, 2020</a:t>
+              <a:t>Holon Institute of Technology, 2020</a:t>
             </a:r>
           </a:p>
         </p:txBody>

</xml_diff>

<commit_message>
Update youtube link in the presentation
</commit_message>
<xml_diff>
--- a/Project presentation/SPA-Presentation.pptx
+++ b/Project presentation/SPA-Presentation.pptx
@@ -308,7 +308,7 @@
           <a:p>
             <a:fld id="{8048F7A8-0824-48EB-B124-DB066AAF77DC}" type="datetimeFigureOut">
               <a:rPr lang="en-US" smtClean="0"/>
-              <a:t>7/9/2020</a:t>
+              <a:t>11-Jul-20</a:t>
             </a:fld>
             <a:endParaRPr lang="en-US"/>
           </a:p>
@@ -744,7 +744,7 @@
           <a:p>
             <a:fld id="{8048F7A8-0824-48EB-B124-DB066AAF77DC}" type="datetimeFigureOut">
               <a:rPr lang="en-US" smtClean="0"/>
-              <a:t>7/9/2020</a:t>
+              <a:t>11-Jul-20</a:t>
             </a:fld>
             <a:endParaRPr lang="en-US"/>
           </a:p>
@@ -994,7 +994,7 @@
           <a:p>
             <a:fld id="{8048F7A8-0824-48EB-B124-DB066AAF77DC}" type="datetimeFigureOut">
               <a:rPr lang="en-US" smtClean="0"/>
-              <a:t>7/9/2020</a:t>
+              <a:t>11-Jul-20</a:t>
             </a:fld>
             <a:endParaRPr lang="en-US"/>
           </a:p>
@@ -1302,7 +1302,7 @@
           <a:p>
             <a:fld id="{8048F7A8-0824-48EB-B124-DB066AAF77DC}" type="datetimeFigureOut">
               <a:rPr lang="en-US" smtClean="0"/>
-              <a:t>7/9/2020</a:t>
+              <a:t>11-Jul-20</a:t>
             </a:fld>
             <a:endParaRPr lang="en-US"/>
           </a:p>
@@ -1620,7 +1620,7 @@
           <a:p>
             <a:fld id="{8048F7A8-0824-48EB-B124-DB066AAF77DC}" type="datetimeFigureOut">
               <a:rPr lang="en-US" smtClean="0"/>
-              <a:t>7/9/2020</a:t>
+              <a:t>11-Jul-20</a:t>
             </a:fld>
             <a:endParaRPr lang="en-US"/>
           </a:p>
@@ -1922,7 +1922,7 @@
           <a:p>
             <a:fld id="{8048F7A8-0824-48EB-B124-DB066AAF77DC}" type="datetimeFigureOut">
               <a:rPr lang="en-US" smtClean="0"/>
-              <a:t>7/9/2020</a:t>
+              <a:t>11-Jul-20</a:t>
             </a:fld>
             <a:endParaRPr lang="en-US"/>
           </a:p>
@@ -2289,7 +2289,7 @@
           <a:p>
             <a:fld id="{8048F7A8-0824-48EB-B124-DB066AAF77DC}" type="datetimeFigureOut">
               <a:rPr lang="en-US" smtClean="0"/>
-              <a:t>7/9/2020</a:t>
+              <a:t>11-Jul-20</a:t>
             </a:fld>
             <a:endParaRPr lang="en-US"/>
           </a:p>
@@ -2463,7 +2463,7 @@
           <a:p>
             <a:fld id="{8048F7A8-0824-48EB-B124-DB066AAF77DC}" type="datetimeFigureOut">
               <a:rPr lang="en-US" smtClean="0"/>
-              <a:t>7/9/2020</a:t>
+              <a:t>11-Jul-20</a:t>
             </a:fld>
             <a:endParaRPr lang="en-US"/>
           </a:p>
@@ -2643,7 +2643,7 @@
           <a:p>
             <a:fld id="{8048F7A8-0824-48EB-B124-DB066AAF77DC}" type="datetimeFigureOut">
               <a:rPr lang="en-US" smtClean="0"/>
-              <a:t>7/9/2020</a:t>
+              <a:t>11-Jul-20</a:t>
             </a:fld>
             <a:endParaRPr lang="en-US"/>
           </a:p>
@@ -2813,7 +2813,7 @@
           <a:p>
             <a:fld id="{8048F7A8-0824-48EB-B124-DB066AAF77DC}" type="datetimeFigureOut">
               <a:rPr lang="en-US" smtClean="0"/>
-              <a:t>7/9/2020</a:t>
+              <a:t>11-Jul-20</a:t>
             </a:fld>
             <a:endParaRPr lang="en-US"/>
           </a:p>
@@ -3063,7 +3063,7 @@
           <a:p>
             <a:fld id="{8048F7A8-0824-48EB-B124-DB066AAF77DC}" type="datetimeFigureOut">
               <a:rPr lang="en-US" smtClean="0"/>
-              <a:t>7/9/2020</a:t>
+              <a:t>11-Jul-20</a:t>
             </a:fld>
             <a:endParaRPr lang="en-US"/>
           </a:p>
@@ -3299,7 +3299,7 @@
           <a:p>
             <a:fld id="{8048F7A8-0824-48EB-B124-DB066AAF77DC}" type="datetimeFigureOut">
               <a:rPr lang="en-US" smtClean="0"/>
-              <a:t>7/9/2020</a:t>
+              <a:t>11-Jul-20</a:t>
             </a:fld>
             <a:endParaRPr lang="en-US"/>
           </a:p>
@@ -3681,7 +3681,7 @@
           <a:p>
             <a:fld id="{8048F7A8-0824-48EB-B124-DB066AAF77DC}" type="datetimeFigureOut">
               <a:rPr lang="en-US" smtClean="0"/>
-              <a:t>7/9/2020</a:t>
+              <a:t>11-Jul-20</a:t>
             </a:fld>
             <a:endParaRPr lang="en-US"/>
           </a:p>
@@ -3799,7 +3799,7 @@
           <a:p>
             <a:fld id="{8048F7A8-0824-48EB-B124-DB066AAF77DC}" type="datetimeFigureOut">
               <a:rPr lang="en-US" smtClean="0"/>
-              <a:t>7/9/2020</a:t>
+              <a:t>11-Jul-20</a:t>
             </a:fld>
             <a:endParaRPr lang="en-US"/>
           </a:p>
@@ -3894,7 +3894,7 @@
           <a:p>
             <a:fld id="{8048F7A8-0824-48EB-B124-DB066AAF77DC}" type="datetimeFigureOut">
               <a:rPr lang="en-US" smtClean="0"/>
-              <a:t>7/9/2020</a:t>
+              <a:t>11-Jul-20</a:t>
             </a:fld>
             <a:endParaRPr lang="en-US"/>
           </a:p>
@@ -4149,7 +4149,7 @@
           <a:p>
             <a:fld id="{8048F7A8-0824-48EB-B124-DB066AAF77DC}" type="datetimeFigureOut">
               <a:rPr lang="en-US" smtClean="0"/>
-              <a:t>7/9/2020</a:t>
+              <a:t>11-Jul-20</a:t>
             </a:fld>
             <a:endParaRPr lang="en-US"/>
           </a:p>
@@ -4432,7 +4432,7 @@
           <a:p>
             <a:fld id="{8048F7A8-0824-48EB-B124-DB066AAF77DC}" type="datetimeFigureOut">
               <a:rPr lang="en-US" smtClean="0"/>
-              <a:t>7/9/2020</a:t>
+              <a:t>11-Jul-20</a:t>
             </a:fld>
             <a:endParaRPr lang="en-US"/>
           </a:p>
@@ -4838,7 +4838,7 @@
           <a:p>
             <a:fld id="{8048F7A8-0824-48EB-B124-DB066AAF77DC}" type="datetimeFigureOut">
               <a:rPr lang="en-US" smtClean="0"/>
-              <a:t>7/9/2020</a:t>
+              <a:t>11-Jul-20</a:t>
             </a:fld>
             <a:endParaRPr lang="en-US"/>
           </a:p>
@@ -6504,6 +6504,12 @@
           </a:p>
           <a:p>
             <a:pPr lvl="1"/>
+            <a:r>
+              <a:rPr lang="en-US" dirty="0">
+                <a:hlinkClick r:id="rId5"/>
+              </a:rPr>
+              <a:t>https://www.youtube.com/watch?v=MyhIwLgkjFY</a:t>
+            </a:r>
             <a:endParaRPr lang="en-US" dirty="0"/>
           </a:p>
         </p:txBody>

</xml_diff>